<commit_message>
Edit README, update new icon
</commit_message>
<xml_diff>
--- a/docs/diagrams/Diagrams.pptx
+++ b/docs/diagrams/Diagrams.pptx
@@ -122,7 +122,7 @@
   </p:defaultTextStyle>
   <p:extLst>
     <p:ext uri="{EFAFB233-063F-42B5-8137-9DF3F51BA10A}">
-      <p15:sldGuideLst xmlns="" xmlns:p15="http://schemas.microsoft.com/office/powerpoint/2012/main">
+      <p15:sldGuideLst xmlns:p15="http://schemas.microsoft.com/office/powerpoint/2012/main">
         <p15:guide id="1" orient="horz" pos="1488">
           <p15:clr>
             <a:srgbClr val="A4A3A4"/>
@@ -221,7 +221,7 @@
           <a:p>
             <a:fld id="{F5CC4B3F-88C1-4FFA-B1B6-F41C21DC6924}" type="datetimeFigureOut">
               <a:rPr lang="en-US" smtClean="0"/>
-              <a:t>11/3/2016</a:t>
+              <a:t>11/5/2016</a:t>
             </a:fld>
             <a:endParaRPr lang="en-US"/>
           </a:p>
@@ -751,7 +751,7 @@
           <a:p>
             <a:fld id="{78C97017-6FC3-485B-9764-EAC9E56C1D49}" type="datetimeFigureOut">
               <a:rPr lang="en-US" smtClean="0"/>
-              <a:t>11/3/2016</a:t>
+              <a:t>11/5/2016</a:t>
             </a:fld>
             <a:endParaRPr lang="en-US"/>
           </a:p>
@@ -919,7 +919,7 @@
           <a:p>
             <a:fld id="{78C97017-6FC3-485B-9764-EAC9E56C1D49}" type="datetimeFigureOut">
               <a:rPr lang="en-US" smtClean="0"/>
-              <a:t>11/3/2016</a:t>
+              <a:t>11/5/2016</a:t>
             </a:fld>
             <a:endParaRPr lang="en-US"/>
           </a:p>
@@ -1097,7 +1097,7 @@
           <a:p>
             <a:fld id="{78C97017-6FC3-485B-9764-EAC9E56C1D49}" type="datetimeFigureOut">
               <a:rPr lang="en-US" smtClean="0"/>
-              <a:t>11/3/2016</a:t>
+              <a:t>11/5/2016</a:t>
             </a:fld>
             <a:endParaRPr lang="en-US"/>
           </a:p>
@@ -1265,7 +1265,7 @@
           <a:p>
             <a:fld id="{78C97017-6FC3-485B-9764-EAC9E56C1D49}" type="datetimeFigureOut">
               <a:rPr lang="en-US" smtClean="0"/>
-              <a:t>11/3/2016</a:t>
+              <a:t>11/5/2016</a:t>
             </a:fld>
             <a:endParaRPr lang="en-US"/>
           </a:p>
@@ -1510,7 +1510,7 @@
           <a:p>
             <a:fld id="{78C97017-6FC3-485B-9764-EAC9E56C1D49}" type="datetimeFigureOut">
               <a:rPr lang="en-US" smtClean="0"/>
-              <a:t>11/3/2016</a:t>
+              <a:t>11/5/2016</a:t>
             </a:fld>
             <a:endParaRPr lang="en-US"/>
           </a:p>
@@ -1795,7 +1795,7 @@
           <a:p>
             <a:fld id="{78C97017-6FC3-485B-9764-EAC9E56C1D49}" type="datetimeFigureOut">
               <a:rPr lang="en-US" smtClean="0"/>
-              <a:t>11/3/2016</a:t>
+              <a:t>11/5/2016</a:t>
             </a:fld>
             <a:endParaRPr lang="en-US"/>
           </a:p>
@@ -2214,7 +2214,7 @@
           <a:p>
             <a:fld id="{78C97017-6FC3-485B-9764-EAC9E56C1D49}" type="datetimeFigureOut">
               <a:rPr lang="en-US" smtClean="0"/>
-              <a:t>11/3/2016</a:t>
+              <a:t>11/5/2016</a:t>
             </a:fld>
             <a:endParaRPr lang="en-US"/>
           </a:p>
@@ -2331,7 +2331,7 @@
           <a:p>
             <a:fld id="{78C97017-6FC3-485B-9764-EAC9E56C1D49}" type="datetimeFigureOut">
               <a:rPr lang="en-US" smtClean="0"/>
-              <a:t>11/3/2016</a:t>
+              <a:t>11/5/2016</a:t>
             </a:fld>
             <a:endParaRPr lang="en-US"/>
           </a:p>
@@ -2426,7 +2426,7 @@
           <a:p>
             <a:fld id="{78C97017-6FC3-485B-9764-EAC9E56C1D49}" type="datetimeFigureOut">
               <a:rPr lang="en-US" smtClean="0"/>
-              <a:t>11/3/2016</a:t>
+              <a:t>11/5/2016</a:t>
             </a:fld>
             <a:endParaRPr lang="en-US"/>
           </a:p>
@@ -2701,7 +2701,7 @@
           <a:p>
             <a:fld id="{78C97017-6FC3-485B-9764-EAC9E56C1D49}" type="datetimeFigureOut">
               <a:rPr lang="en-US" smtClean="0"/>
-              <a:t>11/3/2016</a:t>
+              <a:t>11/5/2016</a:t>
             </a:fld>
             <a:endParaRPr lang="en-US"/>
           </a:p>
@@ -2953,7 +2953,7 @@
           <a:p>
             <a:fld id="{78C97017-6FC3-485B-9764-EAC9E56C1D49}" type="datetimeFigureOut">
               <a:rPr lang="en-US" smtClean="0"/>
-              <a:t>11/3/2016</a:t>
+              <a:t>11/5/2016</a:t>
             </a:fld>
             <a:endParaRPr lang="en-US"/>
           </a:p>
@@ -3164,7 +3164,7 @@
           <a:p>
             <a:fld id="{78C97017-6FC3-485B-9764-EAC9E56C1D49}" type="datetimeFigureOut">
               <a:rPr lang="en-US" smtClean="0"/>
-              <a:t>11/3/2016</a:t>
+              <a:t>11/5/2016</a:t>
             </a:fld>
             <a:endParaRPr lang="en-US"/>
           </a:p>
@@ -3593,13 +3593,6 @@
   <p:clrMapOvr>
     <a:masterClrMapping/>
   </p:clrMapOvr>
-  <p:timing>
-    <p:tnLst>
-      <p:par>
-        <p:cTn id="1" dur="indefinite" restart="never" nodeType="tmRoot"/>
-      </p:par>
-    </p:tnLst>
-  </p:timing>
 </p:sld>
 </file>
 
@@ -4482,14 +4475,6 @@
               </a:rPr>
               <a:t>performUndo</a:t>
             </a:r>
-            <a:r>
-              <a:rPr lang="en-US" sz="1400" dirty="0">
-                <a:solidFill>
-                  <a:srgbClr val="7030A0"/>
-                </a:solidFill>
-              </a:rPr>
-              <a:t/>
-            </a:r>
             <a:br>
               <a:rPr lang="en-US" sz="1400" dirty="0">
                 <a:solidFill>
@@ -10723,14 +10708,6 @@
               </a:rPr>
               <a:t>addMutateCmd</a:t>
             </a:r>
-            <a:r>
-              <a:rPr lang="en-US" sz="1400" dirty="0">
-                <a:solidFill>
-                  <a:srgbClr val="0070C0"/>
-                </a:solidFill>
-              </a:rPr>
-              <a:t/>
-            </a:r>
             <a:br>
               <a:rPr lang="en-US" sz="1400" dirty="0">
                 <a:solidFill>
@@ -13247,6 +13224,68 @@
           <a:chExt cx="0" cy="0"/>
         </a:xfrm>
       </p:grpSpPr>
+      <p:sp>
+        <p:nvSpPr>
+          <p:cNvPr id="2" name="Star: 4 Points 1"/>
+          <p:cNvSpPr/>
+          <p:nvPr/>
+        </p:nvSpPr>
+        <p:spPr>
+          <a:xfrm>
+            <a:off x="2667000" y="2667000"/>
+            <a:ext cx="1625600" cy="1625600"/>
+          </a:xfrm>
+          <a:prstGeom prst="star4">
+            <a:avLst>
+              <a:gd name="adj" fmla="val 21023"/>
+            </a:avLst>
+          </a:prstGeom>
+          <a:solidFill>
+            <a:schemeClr val="tx1">
+              <a:lumMod val="50000"/>
+              <a:lumOff val="50000"/>
+              <a:alpha val="15000"/>
+            </a:schemeClr>
+          </a:solidFill>
+          <a:ln w="127000" cap="flat">
+            <a:solidFill>
+              <a:schemeClr val="bg1"/>
+            </a:solidFill>
+            <a:miter lim="800000"/>
+          </a:ln>
+          <a:effectLst>
+            <a:outerShdw blurRad="63500" sx="102000" sy="102000" algn="ctr" rotWithShape="0">
+              <a:prstClr val="black">
+                <a:alpha val="40000"/>
+              </a:prstClr>
+            </a:outerShdw>
+          </a:effectLst>
+        </p:spPr>
+        <p:style>
+          <a:lnRef idx="2">
+            <a:schemeClr val="dk1">
+              <a:shade val="50000"/>
+            </a:schemeClr>
+          </a:lnRef>
+          <a:fillRef idx="1">
+            <a:schemeClr val="dk1"/>
+          </a:fillRef>
+          <a:effectRef idx="0">
+            <a:schemeClr val="dk1"/>
+          </a:effectRef>
+          <a:fontRef idx="minor">
+            <a:schemeClr val="lt1"/>
+          </a:fontRef>
+        </p:style>
+        <p:txBody>
+          <a:bodyPr rtlCol="0" anchor="ctr"/>
+          <a:lstStyle/>
+          <a:p>
+            <a:pPr algn="ctr"/>
+            <a:endParaRPr lang="en-SG"/>
+          </a:p>
+        </p:txBody>
+      </p:sp>
     </p:spTree>
     <p:extLst>
       <p:ext uri="{BB962C8B-B14F-4D97-AF65-F5344CB8AC3E}">
@@ -14545,13 +14584,6 @@
   <p:clrMapOvr>
     <a:masterClrMapping/>
   </p:clrMapOvr>
-  <p:timing>
-    <p:tnLst>
-      <p:par>
-        <p:cTn id="1" dur="indefinite" restart="never" nodeType="tmRoot"/>
-      </p:par>
-    </p:tnLst>
-  </p:timing>
 </p:sld>
 </file>
 
@@ -24653,14 +24685,6 @@
               </a:rPr>
               <a:t>TaskScheduler</a:t>
             </a:r>
-            <a:r>
-              <a:rPr lang="en-US" sz="1050" dirty="0">
-                <a:solidFill>
-                  <a:schemeClr val="bg1"/>
-                </a:solidFill>
-              </a:rPr>
-              <a:t/>
-            </a:r>
             <a:br>
               <a:rPr lang="en-US" sz="1050" dirty="0">
                 <a:solidFill>
@@ -25249,16 +25273,6 @@
               </a:rPr>
               <a:t>XmlTaskScheduler</a:t>
             </a:r>
-            <a:r>
-              <a:rPr lang="en-US" sz="1050" b="1" dirty="0">
-                <a:solidFill>
-                  <a:schemeClr val="accent6">
-                    <a:lumMod val="75000"/>
-                  </a:schemeClr>
-                </a:solidFill>
-              </a:rPr>
-              <a:t/>
-            </a:r>
             <a:br>
               <a:rPr lang="en-US" sz="1050" b="1" dirty="0">
                 <a:solidFill>
@@ -25616,14 +25630,6 @@
               </a:rPr>
               <a:t>JsonUserPrefs</a:t>
             </a:r>
-            <a:r>
-              <a:rPr lang="en-US" sz="1050" dirty="0">
-                <a:solidFill>
-                  <a:schemeClr val="bg1"/>
-                </a:solidFill>
-              </a:rPr>
-              <a:t/>
-            </a:r>
             <a:br>
               <a:rPr lang="en-US" sz="1050" dirty="0">
                 <a:solidFill>
@@ -25692,16 +25698,6 @@
                 </a:solidFill>
               </a:rPr>
               <a:t>XmlSerializable</a:t>
-            </a:r>
-            <a:r>
-              <a:rPr lang="en-US" sz="1050" b="1" dirty="0">
-                <a:solidFill>
-                  <a:schemeClr val="accent6">
-                    <a:lumMod val="75000"/>
-                  </a:schemeClr>
-                </a:solidFill>
-              </a:rPr>
-              <a:t/>
             </a:r>
             <a:br>
               <a:rPr lang="en-US" sz="1050" b="1" dirty="0">

</xml_diff>